<commit_message>
agregando detalles sobre economicamente
</commit_message>
<xml_diff>
--- a/Presentación14-04-16.pptx
+++ b/Presentación14-04-16.pptx
@@ -32066,12 +32066,7 @@
             <p:ph type="title"/>
           </p:nvPr>
         </p:nvSpPr>
-        <p:spPr>
-          <a:xfrm>
-            <a:off x="611560" y="692696"/>
-            <a:ext cx="7772400" cy="1143000"/>
-          </a:xfrm>
-        </p:spPr>
+        <p:spPr/>
         <p:txBody>
           <a:bodyPr/>
           <a:lstStyle/>
@@ -32113,17 +32108,12 @@
             <p:ph idx="1"/>
           </p:nvPr>
         </p:nvSpPr>
-        <p:spPr>
-          <a:xfrm>
-            <a:off x="827584" y="1988840"/>
-            <a:ext cx="7772400" cy="4114800"/>
-          </a:xfrm>
-        </p:spPr>
+        <p:spPr/>
         <p:txBody>
           <a:bodyPr/>
           <a:lstStyle/>
           <a:p>
-            <a:pPr marL="0" indent="0" algn="just">
+            <a:pPr marL="0" indent="0">
               <a:buNone/>
             </a:pPr>
             <a:r>
@@ -32150,7 +32140,6 @@
             </a:r>
           </a:p>
           <a:p>
-            <a:pPr algn="just"/>
             <a:endParaRPr lang="es-ES" dirty="0"/>
           </a:p>
         </p:txBody>
@@ -32244,7 +32233,7 @@
         </p:blipFill>
         <p:spPr>
           <a:xfrm>
-            <a:off x="954287" y="1628800"/>
+            <a:off x="954287" y="1772816"/>
             <a:ext cx="7722169" cy="4752528"/>
           </a:xfrm>
         </p:spPr>
@@ -32363,7 +32352,7 @@
         </p:nvSpPr>
         <p:spPr>
           <a:xfrm>
-            <a:off x="683568" y="260648"/>
+            <a:off x="1115616" y="116632"/>
             <a:ext cx="7772400" cy="1440160"/>
           </a:xfrm>
         </p:spPr>
@@ -32391,7 +32380,7 @@
         </p:nvSpPr>
         <p:spPr>
           <a:xfrm>
-            <a:off x="683568" y="1772816"/>
+            <a:off x="1254125" y="1772816"/>
             <a:ext cx="7772400" cy="4323184"/>
           </a:xfrm>
         </p:spPr>
@@ -32399,7 +32388,7 @@
           <a:bodyPr/>
           <a:lstStyle/>
           <a:p>
-            <a:pPr marL="0" indent="0" algn="just">
+            <a:pPr marL="0" indent="0">
               <a:buNone/>
             </a:pPr>
             <a:r>
@@ -32510,33 +32499,10 @@
                 <a:ea typeface="+mn-ea"/>
                 <a:cs typeface="+mn-cs"/>
               </a:rPr>
-              <a:t>de ellos, una vez seleccionado  el </a:t>
-            </a:r>
-            <a:r>
-              <a:rPr lang="es-ES" sz="2000" dirty="0" smtClean="0">
-                <a:solidFill>
-                  <a:schemeClr val="tx1"/>
-                </a:solidFill>
-                <a:latin typeface="+mn-lt"/>
-                <a:ea typeface="+mn-ea"/>
-                <a:cs typeface="+mn-cs"/>
-              </a:rPr>
-              <a:t>restaurante, </a:t>
-            </a:r>
-            <a:r>
-              <a:rPr lang="es-ES" sz="2000" dirty="0">
-                <a:solidFill>
-                  <a:schemeClr val="tx1"/>
-                </a:solidFill>
-                <a:latin typeface="+mn-lt"/>
-                <a:ea typeface="+mn-ea"/>
-                <a:cs typeface="+mn-cs"/>
-              </a:rPr>
-              <a:t>se desplegará una interfaz con las opciones del menú donde el cliente por medio de imágenes con sus respectivas descripciones optara por su plato de preferencia. Una vez seleccionado el menú el cliente tiene como opción marcar si su pedido será a domicilio o si pasara a retirar. Realizado esto aparecerán los datos personales con la lista de pedido que ha hecho el cliente con sus respectivos precios y el monto total a abonar. Si el cliente está de acuerdo presiona el botón para confirmar su pedido y se le mostrara un mensaje de recepción y confirmación. </a:t>
+              <a:t>de ellos, una vez seleccionado  el restaurante se desplegará una interfaz con las opciones del menú donde el cliente por medio de imágenes con sus respectivas descripciones optara por su plato de preferencia. Una vez seleccionado el menú el cliente tiene como opción marcar si su pedido será a domicilio o si pasara a retirar. Realizado esto aparecerán los datos personales con la lista de pedido que ha hecho el cliente con sus respectivos precios y el monto total a abonar. Si el cliente está de acuerdo presiona el botón para confirmar su pedido y se le mostrara un mensaje de recepción y confirmación. </a:t>
             </a:r>
           </a:p>
           <a:p>
-            <a:pPr algn="just"/>
             <a:endParaRPr lang="es-ES" dirty="0"/>
           </a:p>
         </p:txBody>
@@ -32682,12 +32648,7 @@
             <p:ph type="title"/>
           </p:nvPr>
         </p:nvSpPr>
-        <p:spPr>
-          <a:xfrm>
-            <a:off x="755576" y="404664"/>
-            <a:ext cx="7772400" cy="1143000"/>
-          </a:xfrm>
-        </p:spPr>
+        <p:spPr/>
         <p:txBody>
           <a:bodyPr/>
           <a:lstStyle/>
@@ -32766,7 +32727,7 @@
         </p:nvSpPr>
         <p:spPr>
           <a:xfrm>
-            <a:off x="827584" y="1700808"/>
+            <a:off x="1187624" y="1988840"/>
             <a:ext cx="7772400" cy="4402832"/>
           </a:xfrm>
         </p:spPr>
@@ -32789,8 +32750,13 @@
             </a:r>
             <a:r>
               <a:rPr lang="es-ES" sz="1600" dirty="0" smtClean="0"/>
-              <a:t>Sistema.</a:t>
+              <a:t>Sistema</a:t>
             </a:r>
+            <a:r>
+              <a:rPr lang="es-ES" sz="1600" dirty="0" smtClean="0"/>
+              <a:t>.</a:t>
+            </a:r>
+            <a:endParaRPr lang="es-ES" sz="1600" dirty="0" smtClean="0"/>
           </a:p>
           <a:p>
             <a:pPr marL="0" indent="0">
@@ -32804,8 +32770,33 @@
           <a:p>
             <a:r>
               <a:rPr lang="es-ES" sz="1600" dirty="0" smtClean="0"/>
-              <a:t> No representa un costo muy elevado .</a:t>
+              <a:t>No </a:t>
             </a:r>
+            <a:r>
+              <a:rPr lang="es-ES" sz="1600" dirty="0" smtClean="0"/>
+              <a:t>representa un costo muy elevado </a:t>
+            </a:r>
+            <a:r>
+              <a:rPr lang="es-ES" sz="1600" dirty="0" smtClean="0"/>
+              <a:t>.</a:t>
+            </a:r>
+          </a:p>
+          <a:p>
+            <a:r>
+              <a:rPr lang="es-ES" sz="1600" dirty="0"/>
+              <a:t>Contamos con el tiempo debido  de los involucrados para el desarrollo.</a:t>
+            </a:r>
+          </a:p>
+          <a:p>
+            <a:r>
+              <a:rPr lang="es-ES" sz="1600" dirty="0" smtClean="0"/>
+              <a:t>Como es un proyecto universitario no tendrá </a:t>
+            </a:r>
+            <a:r>
+              <a:rPr lang="es-ES" sz="1600" smtClean="0"/>
+              <a:t>ningún costo.</a:t>
+            </a:r>
+            <a:endParaRPr lang="es-ES" sz="1600" dirty="0" smtClean="0"/>
           </a:p>
           <a:p>
             <a:pPr marL="0" indent="0">

</xml_diff>

<commit_message>
modificando diapositiva y requerimiento
</commit_message>
<xml_diff>
--- a/Presentación14-04-16.pptx
+++ b/Presentación14-04-16.pptx
@@ -32066,7 +32066,12 @@
             <p:ph type="title"/>
           </p:nvPr>
         </p:nvSpPr>
-        <p:spPr/>
+        <p:spPr>
+          <a:xfrm>
+            <a:off x="611560" y="692696"/>
+            <a:ext cx="7772400" cy="1143000"/>
+          </a:xfrm>
+        </p:spPr>
         <p:txBody>
           <a:bodyPr/>
           <a:lstStyle/>
@@ -32108,12 +32113,17 @@
             <p:ph idx="1"/>
           </p:nvPr>
         </p:nvSpPr>
-        <p:spPr/>
+        <p:spPr>
+          <a:xfrm>
+            <a:off x="827584" y="1988840"/>
+            <a:ext cx="7772400" cy="4114800"/>
+          </a:xfrm>
+        </p:spPr>
         <p:txBody>
           <a:bodyPr/>
           <a:lstStyle/>
           <a:p>
-            <a:pPr marL="0" indent="0">
+            <a:pPr marL="0" indent="0" algn="just">
               <a:buNone/>
             </a:pPr>
             <a:r>
@@ -32140,6 +32150,7 @@
             </a:r>
           </a:p>
           <a:p>
+            <a:pPr algn="just"/>
             <a:endParaRPr lang="es-ES" dirty="0"/>
           </a:p>
         </p:txBody>
@@ -32233,7 +32244,7 @@
         </p:blipFill>
         <p:spPr>
           <a:xfrm>
-            <a:off x="954287" y="1772816"/>
+            <a:off x="954287" y="1628800"/>
             <a:ext cx="7722169" cy="4752528"/>
           </a:xfrm>
         </p:spPr>
@@ -32352,7 +32363,7 @@
         </p:nvSpPr>
         <p:spPr>
           <a:xfrm>
-            <a:off x="1115616" y="116632"/>
+            <a:off x="683568" y="260648"/>
             <a:ext cx="7772400" cy="1440160"/>
           </a:xfrm>
         </p:spPr>
@@ -32380,7 +32391,7 @@
         </p:nvSpPr>
         <p:spPr>
           <a:xfrm>
-            <a:off x="1254125" y="1772816"/>
+            <a:off x="683568" y="1772816"/>
             <a:ext cx="7772400" cy="4323184"/>
           </a:xfrm>
         </p:spPr>
@@ -32388,7 +32399,7 @@
           <a:bodyPr/>
           <a:lstStyle/>
           <a:p>
-            <a:pPr marL="0" indent="0">
+            <a:pPr marL="0" indent="0" algn="just">
               <a:buNone/>
             </a:pPr>
             <a:r>
@@ -32499,10 +32510,33 @@
                 <a:ea typeface="+mn-ea"/>
                 <a:cs typeface="+mn-cs"/>
               </a:rPr>
-              <a:t>de ellos, una vez seleccionado  el restaurante se desplegará una interfaz con las opciones del menú donde el cliente por medio de imágenes con sus respectivas descripciones optara por su plato de preferencia. Una vez seleccionado el menú el cliente tiene como opción marcar si su pedido será a domicilio o si pasara a retirar. Realizado esto aparecerán los datos personales con la lista de pedido que ha hecho el cliente con sus respectivos precios y el monto total a abonar. Si el cliente está de acuerdo presiona el botón para confirmar su pedido y se le mostrara un mensaje de recepción y confirmación. </a:t>
+              <a:t>de ellos, una vez seleccionado  el </a:t>
+            </a:r>
+            <a:r>
+              <a:rPr lang="es-ES" sz="2000" dirty="0" smtClean="0">
+                <a:solidFill>
+                  <a:schemeClr val="tx1"/>
+                </a:solidFill>
+                <a:latin typeface="+mn-lt"/>
+                <a:ea typeface="+mn-ea"/>
+                <a:cs typeface="+mn-cs"/>
+              </a:rPr>
+              <a:t>restaurante, </a:t>
+            </a:r>
+            <a:r>
+              <a:rPr lang="es-ES" sz="2000" dirty="0">
+                <a:solidFill>
+                  <a:schemeClr val="tx1"/>
+                </a:solidFill>
+                <a:latin typeface="+mn-lt"/>
+                <a:ea typeface="+mn-ea"/>
+                <a:cs typeface="+mn-cs"/>
+              </a:rPr>
+              <a:t>se desplegará una interfaz con las opciones del menú donde el cliente por medio de imágenes con sus respectivas descripciones optara por su plato de preferencia. Una vez seleccionado el menú el cliente tiene como opción marcar si su pedido será a domicilio o si pasara a retirar. Realizado esto aparecerán los datos personales con la lista de pedido que ha hecho el cliente con sus respectivos precios y el monto total a abonar. Si el cliente está de acuerdo presiona el botón para confirmar su pedido y se le mostrara un mensaje de recepción y confirmación. </a:t>
             </a:r>
           </a:p>
           <a:p>
+            <a:pPr algn="just"/>
             <a:endParaRPr lang="es-ES" dirty="0"/>
           </a:p>
         </p:txBody>
@@ -32648,7 +32682,12 @@
             <p:ph type="title"/>
           </p:nvPr>
         </p:nvSpPr>
-        <p:spPr/>
+        <p:spPr>
+          <a:xfrm>
+            <a:off x="755576" y="404664"/>
+            <a:ext cx="7772400" cy="1143000"/>
+          </a:xfrm>
+        </p:spPr>
         <p:txBody>
           <a:bodyPr/>
           <a:lstStyle/>
@@ -32727,7 +32766,7 @@
         </p:nvSpPr>
         <p:spPr>
           <a:xfrm>
-            <a:off x="1187624" y="1988840"/>
+            <a:off x="827584" y="1700808"/>
             <a:ext cx="7772400" cy="4402832"/>
           </a:xfrm>
         </p:spPr>

</xml_diff>